<commit_message>
ppt still needs GUI and Database Arch.
</commit_message>
<xml_diff>
--- a/Sprint 5/DanceSoft powerpoint sprint 5.pptx
+++ b/Sprint 5/DanceSoft powerpoint sprint 5.pptx
@@ -14,11 +14,11 @@
     <p:sldId id="259" r:id="rId8"/>
     <p:sldId id="279" r:id="rId9"/>
     <p:sldId id="277" r:id="rId10"/>
-    <p:sldId id="286" r:id="rId11"/>
-    <p:sldId id="273" r:id="rId12"/>
-    <p:sldId id="272" r:id="rId13"/>
-    <p:sldId id="274" r:id="rId14"/>
-    <p:sldId id="263" r:id="rId15"/>
+    <p:sldId id="273" r:id="rId11"/>
+    <p:sldId id="272" r:id="rId12"/>
+    <p:sldId id="274" r:id="rId13"/>
+    <p:sldId id="263" r:id="rId14"/>
+    <p:sldId id="286" r:id="rId15"/>
     <p:sldId id="264" r:id="rId16"/>
     <p:sldId id="265" r:id="rId17"/>
     <p:sldId id="268" r:id="rId18"/>
@@ -365,7 +365,7 @@
           <a:p>
             <a:fld id="{4BDF68E2-58F2-4D09-BE8B-E3BD06533059}" type="datetimeFigureOut">
               <a:rPr lang="en-US" dirty="0"/>
-              <a:t>3/20/2016</a:t>
+              <a:t>3/22/2016</a:t>
             </a:fld>
             <a:endParaRPr lang="en-US" dirty="0"/>
           </a:p>
@@ -568,7 +568,7 @@
           <a:p>
             <a:fld id="{2E2D6473-DF6D-4702-B328-E0DD40540A4E}" type="datetimeFigureOut">
               <a:rPr lang="en-US" dirty="0"/>
-              <a:t>3/20/2016</a:t>
+              <a:t>3/22/2016</a:t>
             </a:fld>
             <a:endParaRPr lang="en-US" dirty="0"/>
           </a:p>
@@ -819,7 +819,7 @@
           <a:p>
             <a:fld id="{E26F7E3A-B166-407D-9866-32884E7D5B37}" type="datetimeFigureOut">
               <a:rPr lang="en-US" dirty="0"/>
-              <a:t>3/20/2016</a:t>
+              <a:t>3/22/2016</a:t>
             </a:fld>
             <a:endParaRPr lang="en-US" dirty="0"/>
           </a:p>
@@ -988,7 +988,7 @@
           <a:p>
             <a:fld id="{528FC5F6-F338-4AE4-BB23-26385BCFC423}" type="datetimeFigureOut">
               <a:rPr lang="en-US" dirty="0"/>
-              <a:t>3/20/2016</a:t>
+              <a:t>3/22/2016</a:t>
             </a:fld>
             <a:endParaRPr lang="en-US" dirty="0"/>
           </a:p>
@@ -1326,7 +1326,7 @@
           <a:p>
             <a:fld id="{20EBB0C4-6273-4C6E-B9BD-2EDC30F1CD52}" type="datetimeFigureOut">
               <a:rPr lang="en-US" dirty="0"/>
-              <a:t>3/20/2016</a:t>
+              <a:t>3/22/2016</a:t>
             </a:fld>
             <a:endParaRPr lang="en-US" dirty="0"/>
           </a:p>
@@ -1596,7 +1596,7 @@
           <a:p>
             <a:fld id="{19AB4D41-86C1-4908-B66A-0B50CEB3BF29}" type="datetimeFigureOut">
               <a:rPr lang="en-US" dirty="0"/>
-              <a:t>3/20/2016</a:t>
+              <a:t>3/22/2016</a:t>
             </a:fld>
             <a:endParaRPr lang="en-US" dirty="0"/>
           </a:p>
@@ -1970,7 +1970,7 @@
           <a:p>
             <a:fld id="{E6426E2C-56C1-4E0D-A793-0088A7FDD37E}" type="datetimeFigureOut">
               <a:rPr lang="en-US" dirty="0"/>
-              <a:t>3/20/2016</a:t>
+              <a:t>3/22/2016</a:t>
             </a:fld>
             <a:endParaRPr lang="en-US" dirty="0"/>
           </a:p>
@@ -2083,7 +2083,7 @@
           <a:p>
             <a:fld id="{C8C39B41-D8B5-4052-B551-9B5525EAA8B6}" type="datetimeFigureOut">
               <a:rPr lang="en-US" dirty="0"/>
-              <a:t>3/20/2016</a:t>
+              <a:t>3/22/2016</a:t>
             </a:fld>
             <a:endParaRPr lang="en-US" dirty="0"/>
           </a:p>
@@ -2249,7 +2249,7 @@
           <a:p>
             <a:fld id="{4D94136C-8742-45B2-AF27-D93DF72833A9}" type="datetimeFigureOut">
               <a:rPr lang="en-US" dirty="0"/>
-              <a:t>3/20/2016</a:t>
+              <a:t>3/22/2016</a:t>
             </a:fld>
             <a:endParaRPr lang="en-US" dirty="0"/>
           </a:p>
@@ -2599,7 +2599,7 @@
           <a:p>
             <a:fld id="{32ABBEA6-7C60-4B02-AE87-00D78D8422AF}" type="datetimeFigureOut">
               <a:rPr lang="en-US" dirty="0"/>
-              <a:t>3/20/2016</a:t>
+              <a:t>3/22/2016</a:t>
             </a:fld>
             <a:endParaRPr lang="en-US" dirty="0"/>
           </a:p>
@@ -2977,7 +2977,7 @@
           <a:p>
             <a:fld id="{C9CAD897-D46E-4AD2-BD9B-49DD3E640873}" type="datetimeFigureOut">
               <a:rPr lang="en-US" dirty="0"/>
-              <a:t>3/20/2016</a:t>
+              <a:t>3/22/2016</a:t>
             </a:fld>
             <a:endParaRPr lang="en-US" dirty="0"/>
           </a:p>
@@ -3259,7 +3259,7 @@
           <a:p>
             <a:fld id="{98624D31-43A5-475A-80CF-332C9F6DCF35}" type="datetimeFigureOut">
               <a:rPr lang="en-US" dirty="0"/>
-              <a:t>3/20/2016</a:t>
+              <a:t>3/22/2016</a:t>
             </a:fld>
             <a:endParaRPr lang="en-US" dirty="0"/>
           </a:p>
@@ -3880,7 +3880,7 @@
           <a:p>
             <a:r>
               <a:rPr lang="en-US" dirty="0" smtClean="0"/>
-              <a:t>Prototype/Demo</a:t>
+              <a:t>Project Update</a:t>
             </a:r>
             <a:endParaRPr lang="en-US" dirty="0"/>
           </a:p>
@@ -3901,14 +3901,80 @@
           <a:bodyPr/>
           <a:lstStyle/>
           <a:p>
-            <a:endParaRPr lang="en-US"/>
+            <a:r>
+              <a:rPr lang="en-US" dirty="0" smtClean="0"/>
+              <a:t>Updates since last presentation:</a:t>
+            </a:r>
+          </a:p>
+          <a:p>
+            <a:pPr>
+              <a:buFont typeface="Wingdings" panose="05000000000000000000" pitchFamily="2" charset="2"/>
+              <a:buChar char="§"/>
+            </a:pPr>
+            <a:r>
+              <a:rPr lang="en-US" dirty="0" smtClean="0"/>
+              <a:t>Dropped Student Interface</a:t>
+            </a:r>
+          </a:p>
+          <a:p>
+            <a:pPr>
+              <a:buFont typeface="Wingdings" panose="05000000000000000000" pitchFamily="2" charset="2"/>
+              <a:buChar char="§"/>
+            </a:pPr>
+            <a:r>
+              <a:rPr lang="en-US" dirty="0" smtClean="0"/>
+              <a:t>Added User Stories to compensate</a:t>
+            </a:r>
+          </a:p>
+          <a:p>
+            <a:pPr>
+              <a:buFont typeface="Wingdings" panose="05000000000000000000" pitchFamily="2" charset="2"/>
+              <a:buChar char="§"/>
+            </a:pPr>
+            <a:r>
+              <a:rPr lang="en-US" dirty="0" smtClean="0"/>
+              <a:t>Billing Functions</a:t>
+            </a:r>
+          </a:p>
+          <a:p>
+            <a:pPr>
+              <a:buFont typeface="Wingdings" panose="05000000000000000000" pitchFamily="2" charset="2"/>
+              <a:buChar char="§"/>
+            </a:pPr>
+            <a:r>
+              <a:rPr lang="en-US" dirty="0" smtClean="0"/>
+              <a:t>Bug Fixes</a:t>
+            </a:r>
+          </a:p>
+          <a:p>
+            <a:pPr>
+              <a:buFont typeface="Wingdings" panose="05000000000000000000" pitchFamily="2" charset="2"/>
+              <a:buChar char="§"/>
+            </a:pPr>
+            <a:r>
+              <a:rPr lang="en-US" dirty="0" smtClean="0"/>
+              <a:t>Quality of Life Update</a:t>
+            </a:r>
+          </a:p>
+          <a:p>
+            <a:pPr>
+              <a:buFont typeface="Wingdings" panose="05000000000000000000" pitchFamily="2" charset="2"/>
+              <a:buChar char="§"/>
+            </a:pPr>
+            <a:r>
+              <a:rPr lang="en-US" dirty="0" smtClean="0"/>
+              <a:t>Final Requirements/ Updates</a:t>
+            </a:r>
+          </a:p>
+          <a:p>
+            <a:endParaRPr lang="en-US" dirty="0" smtClean="0"/>
           </a:p>
         </p:txBody>
       </p:sp>
     </p:spTree>
     <p:extLst>
       <p:ext uri="{BB962C8B-B14F-4D97-AF65-F5344CB8AC3E}">
-        <p14:creationId xmlns:p14="http://schemas.microsoft.com/office/powerpoint/2010/main" val="3932090167"/>
+        <p14:creationId xmlns:p14="http://schemas.microsoft.com/office/powerpoint/2010/main" val="386440695"/>
       </p:ext>
     </p:extLst>
   </p:cSld>
@@ -3959,7 +4025,7 @@
           <a:p>
             <a:r>
               <a:rPr lang="en-US" dirty="0" smtClean="0"/>
-              <a:t>Project Update</a:t>
+              <a:t>Tool and Budget Update </a:t>
             </a:r>
             <a:endParaRPr lang="en-US" dirty="0"/>
           </a:p>
@@ -3977,30 +4043,67 @@
         </p:nvSpPr>
         <p:spPr/>
         <p:txBody>
-          <a:bodyPr/>
-          <a:lstStyle/>
-          <a:p>
-            <a:r>
-              <a:rPr lang="en-US" dirty="0" smtClean="0"/>
-              <a:t>Updates since </a:t>
-            </a:r>
-            <a:r>
-              <a:rPr lang="en-US" dirty="0" smtClean="0"/>
-              <a:t>last presentation</a:t>
-            </a:r>
-            <a:r>
-              <a:rPr lang="en-US" dirty="0" smtClean="0"/>
-              <a:t>:</a:t>
-            </a:r>
-          </a:p>
+          <a:bodyPr>
+            <a:normAutofit lnSpcReduction="10000"/>
+          </a:bodyPr>
+          <a:lstStyle/>
           <a:p>
             <a:pPr>
               <a:buFont typeface="Wingdings" panose="05000000000000000000" pitchFamily="2" charset="2"/>
               <a:buChar char="§"/>
             </a:pPr>
             <a:r>
-              <a:rPr lang="en-US" dirty="0" smtClean="0"/>
-              <a:t>Dropped Student Interface</a:t>
+              <a:rPr lang="en-US" sz="3200" dirty="0" smtClean="0"/>
+              <a:t>Tools:</a:t>
+            </a:r>
+          </a:p>
+          <a:p>
+            <a:pPr lvl="1">
+              <a:buFont typeface="Wingdings" panose="05000000000000000000" pitchFamily="2" charset="2"/>
+              <a:buChar char="§"/>
+            </a:pPr>
+            <a:r>
+              <a:rPr lang="en-US" sz="3000" dirty="0" err="1" smtClean="0"/>
+              <a:t>Xcode</a:t>
+            </a:r>
+            <a:r>
+              <a:rPr lang="en-US" sz="3000" dirty="0" smtClean="0"/>
+              <a:t> and Python IDE</a:t>
+            </a:r>
+          </a:p>
+          <a:p>
+            <a:pPr lvl="1">
+              <a:buFont typeface="Wingdings" panose="05000000000000000000" pitchFamily="2" charset="2"/>
+              <a:buChar char="§"/>
+            </a:pPr>
+            <a:r>
+              <a:rPr lang="en-US" sz="3000" dirty="0" err="1" smtClean="0"/>
+              <a:t>Github</a:t>
+            </a:r>
+            <a:r>
+              <a:rPr lang="en-US" sz="3000" dirty="0" smtClean="0"/>
+              <a:t> and Trello</a:t>
+            </a:r>
+          </a:p>
+          <a:p>
+            <a:pPr lvl="1">
+              <a:buFont typeface="Wingdings" panose="05000000000000000000" pitchFamily="2" charset="2"/>
+              <a:buChar char="§"/>
+            </a:pPr>
+            <a:r>
+              <a:rPr lang="en-US" sz="3000" dirty="0" err="1" smtClean="0"/>
+              <a:t>PyQt</a:t>
+            </a:r>
+            <a:endParaRPr lang="en-US" sz="3000" dirty="0" smtClean="0"/>
+          </a:p>
+          <a:p>
+            <a:pPr lvl="1">
+              <a:buFont typeface="Wingdings" panose="05000000000000000000" pitchFamily="2" charset="2"/>
+              <a:buChar char="§"/>
+            </a:pPr>
+            <a:r>
+              <a:rPr lang="en-US" sz="3000" dirty="0" smtClean="0"/>
+              <a:t>MySQL</a:t>
             </a:r>
           </a:p>
           <a:p>
@@ -4009,8 +4112,24 @@
               <a:buChar char="§"/>
             </a:pPr>
             <a:r>
-              <a:rPr lang="en-US" dirty="0" smtClean="0"/>
-              <a:t>Added User Stories to compensate</a:t>
+              <a:rPr lang="en-US" sz="3200" dirty="0" smtClean="0"/>
+              <a:t>No </a:t>
+            </a:r>
+            <a:r>
+              <a:rPr lang="en-US" sz="3200" dirty="0"/>
+              <a:t>b</a:t>
+            </a:r>
+            <a:r>
+              <a:rPr lang="en-US" sz="3200" dirty="0" smtClean="0"/>
+              <a:t>udget currently - </a:t>
+            </a:r>
+            <a:r>
+              <a:rPr lang="en-US" sz="3200" dirty="0"/>
+              <a:t>B</a:t>
+            </a:r>
+            <a:r>
+              <a:rPr lang="en-US" sz="3200" dirty="0" smtClean="0"/>
+              <a:t>ox budget not currently decided </a:t>
             </a:r>
           </a:p>
           <a:p>
@@ -4019,8 +4138,20 @@
               <a:buChar char="§"/>
             </a:pPr>
             <a:r>
-              <a:rPr lang="en-US" dirty="0" smtClean="0"/>
-              <a:t>Billing Functions</a:t>
+              <a:rPr lang="en-US" sz="3200" dirty="0"/>
+              <a:t>Intellectual </a:t>
+            </a:r>
+            <a:r>
+              <a:rPr lang="en-US" sz="3200" dirty="0" smtClean="0"/>
+              <a:t>Property: All open source, licensed under </a:t>
+            </a:r>
+            <a:r>
+              <a:rPr lang="en-US" sz="3200" dirty="0" err="1" smtClean="0"/>
+              <a:t>PyQt’s</a:t>
+            </a:r>
+            <a:r>
+              <a:rPr lang="en-US" sz="3200" dirty="0" smtClean="0"/>
+              <a:t> special GPL. </a:t>
             </a:r>
           </a:p>
           <a:p>
@@ -4028,41 +4159,14 @@
               <a:buFont typeface="Wingdings" panose="05000000000000000000" pitchFamily="2" charset="2"/>
               <a:buChar char="§"/>
             </a:pPr>
-            <a:r>
-              <a:rPr lang="en-US" dirty="0" smtClean="0"/>
-              <a:t>Bug Fixes</a:t>
-            </a:r>
-          </a:p>
-          <a:p>
-            <a:pPr>
-              <a:buFont typeface="Wingdings" panose="05000000000000000000" pitchFamily="2" charset="2"/>
-              <a:buChar char="§"/>
-            </a:pPr>
-            <a:r>
-              <a:rPr lang="en-US" dirty="0" smtClean="0"/>
-              <a:t>Quality of Life Update</a:t>
-            </a:r>
-          </a:p>
-          <a:p>
-            <a:pPr>
-              <a:buFont typeface="Wingdings" panose="05000000000000000000" pitchFamily="2" charset="2"/>
-              <a:buChar char="§"/>
-            </a:pPr>
-            <a:r>
-              <a:rPr lang="en-US" dirty="0" smtClean="0"/>
-              <a:t>Final Requirements/ Updates</a:t>
-            </a:r>
-            <a:endParaRPr lang="en-US" dirty="0" smtClean="0"/>
-          </a:p>
-          <a:p>
-            <a:endParaRPr lang="en-US" dirty="0" smtClean="0"/>
+            <a:endParaRPr lang="en-US" sz="3200" dirty="0" smtClean="0"/>
           </a:p>
         </p:txBody>
       </p:sp>
     </p:spTree>
     <p:extLst>
       <p:ext uri="{BB962C8B-B14F-4D97-AF65-F5344CB8AC3E}">
-        <p14:creationId xmlns:p14="http://schemas.microsoft.com/office/powerpoint/2010/main" val="386440695"/>
+        <p14:creationId xmlns:p14="http://schemas.microsoft.com/office/powerpoint/2010/main" val="2470640020"/>
       </p:ext>
     </p:extLst>
   </p:cSld>
@@ -4113,7 +4217,7 @@
           <a:p>
             <a:r>
               <a:rPr lang="en-US" dirty="0" smtClean="0"/>
-              <a:t>Tool and Budget Update </a:t>
+              <a:t>Successes and Failures</a:t>
             </a:r>
             <a:endParaRPr lang="en-US" dirty="0"/>
           </a:p>
@@ -4131,9 +4235,7 @@
         </p:nvSpPr>
         <p:spPr/>
         <p:txBody>
-          <a:bodyPr>
-            <a:normAutofit lnSpcReduction="10000"/>
-          </a:bodyPr>
+          <a:bodyPr/>
           <a:lstStyle/>
           <a:p>
             <a:pPr>
@@ -4141,8 +4243,8 @@
               <a:buChar char="§"/>
             </a:pPr>
             <a:r>
-              <a:rPr lang="en-US" sz="3200" dirty="0" smtClean="0"/>
-              <a:t>Tools:</a:t>
+              <a:rPr lang="en-US" sz="2400" dirty="0" smtClean="0"/>
+              <a:t>Successes: </a:t>
             </a:r>
           </a:p>
           <a:p>
@@ -4151,18 +4253,9 @@
               <a:buChar char="§"/>
             </a:pPr>
             <a:r>
-              <a:rPr lang="en-US" sz="3000" dirty="0" err="1" smtClean="0"/>
-              <a:t>Xcode</a:t>
-            </a:r>
-            <a:r>
-              <a:rPr lang="en-US" sz="3000" dirty="0" smtClean="0"/>
-              <a:t> and </a:t>
-            </a:r>
-            <a:r>
-              <a:rPr lang="en-US" sz="3000" dirty="0" smtClean="0"/>
-              <a:t>Python IDE</a:t>
-            </a:r>
-            <a:endParaRPr lang="en-US" sz="3000" dirty="0" smtClean="0"/>
+              <a:rPr lang="en-US" sz="2000" dirty="0" smtClean="0"/>
+              <a:t>On track to deliver final project</a:t>
+            </a:r>
           </a:p>
           <a:p>
             <a:pPr lvl="1">
@@ -4170,12 +4263,8 @@
               <a:buChar char="§"/>
             </a:pPr>
             <a:r>
-              <a:rPr lang="en-US" sz="3000" dirty="0" err="1" smtClean="0"/>
-              <a:t>Github</a:t>
-            </a:r>
-            <a:r>
-              <a:rPr lang="en-US" sz="3000" dirty="0" smtClean="0"/>
-              <a:t> and Trello</a:t>
+              <a:rPr lang="en-US" sz="2000" dirty="0" smtClean="0"/>
+              <a:t>Team worked effectively overall</a:t>
             </a:r>
           </a:p>
           <a:p>
@@ -4184,10 +4273,26 @@
               <a:buChar char="§"/>
             </a:pPr>
             <a:r>
-              <a:rPr lang="en-US" sz="3000" dirty="0" err="1" smtClean="0"/>
-              <a:t>PyQt</a:t>
-            </a:r>
-            <a:endParaRPr lang="en-US" sz="3000" dirty="0" smtClean="0"/>
+              <a:rPr lang="en-US" sz="2000" dirty="0" smtClean="0"/>
+              <a:t>Got project to a internal testing state (proof of function state) </a:t>
+            </a:r>
+          </a:p>
+          <a:p>
+            <a:pPr>
+              <a:buFont typeface="Wingdings" panose="05000000000000000000" pitchFamily="2" charset="2"/>
+              <a:buChar char="§"/>
+            </a:pPr>
+            <a:endParaRPr lang="en-US" dirty="0"/>
+          </a:p>
+          <a:p>
+            <a:pPr>
+              <a:buFont typeface="Wingdings" panose="05000000000000000000" pitchFamily="2" charset="2"/>
+              <a:buChar char="§"/>
+            </a:pPr>
+            <a:r>
+              <a:rPr lang="en-US" sz="2400" dirty="0" smtClean="0"/>
+              <a:t>Failures:</a:t>
+            </a:r>
           </a:p>
           <a:p>
             <a:pPr lvl="1">
@@ -4195,85 +4300,36 @@
               <a:buChar char="§"/>
             </a:pPr>
             <a:r>
-              <a:rPr lang="en-US" sz="3000" dirty="0" smtClean="0"/>
-              <a:t>MySQL</a:t>
-            </a:r>
-            <a:endParaRPr lang="en-US" sz="3000" dirty="0" smtClean="0"/>
-          </a:p>
-          <a:p>
-            <a:pPr>
-              <a:buFont typeface="Wingdings" panose="05000000000000000000" pitchFamily="2" charset="2"/>
-              <a:buChar char="§"/>
-            </a:pPr>
-            <a:r>
-              <a:rPr lang="en-US" sz="3200" dirty="0" smtClean="0"/>
-              <a:t>No </a:t>
-            </a:r>
-            <a:r>
-              <a:rPr lang="en-US" sz="3200" dirty="0"/>
-              <a:t>b</a:t>
-            </a:r>
-            <a:r>
-              <a:rPr lang="en-US" sz="3200" dirty="0" smtClean="0"/>
-              <a:t>udget currently - </a:t>
-            </a:r>
-            <a:r>
-              <a:rPr lang="en-US" sz="3200" dirty="0"/>
-              <a:t>B</a:t>
-            </a:r>
-            <a:r>
-              <a:rPr lang="en-US" sz="3200" dirty="0" smtClean="0"/>
-              <a:t>ox budget not currently decided </a:t>
-            </a:r>
-          </a:p>
-          <a:p>
-            <a:pPr>
-              <a:buFont typeface="Wingdings" panose="05000000000000000000" pitchFamily="2" charset="2"/>
-              <a:buChar char="§"/>
-            </a:pPr>
-            <a:r>
-              <a:rPr lang="en-US" sz="3200" dirty="0"/>
-              <a:t>Intellectual </a:t>
-            </a:r>
-            <a:r>
-              <a:rPr lang="en-US" sz="3200" dirty="0" smtClean="0"/>
-              <a:t>Property: All open source, </a:t>
-            </a:r>
-            <a:r>
-              <a:rPr lang="en-US" sz="3200" dirty="0" smtClean="0"/>
-              <a:t>licensed</a:t>
-            </a:r>
-            <a:r>
-              <a:rPr lang="en-US" sz="3200" dirty="0" smtClean="0"/>
-              <a:t> under </a:t>
-            </a:r>
-            <a:r>
-              <a:rPr lang="en-US" sz="3200" dirty="0" err="1" smtClean="0"/>
-              <a:t>PyQt</a:t>
-            </a:r>
-            <a:r>
-              <a:rPr lang="en-US" sz="3200" dirty="0" err="1" smtClean="0"/>
-              <a:t>’s</a:t>
-            </a:r>
-            <a:r>
-              <a:rPr lang="en-US" sz="3200" dirty="0" smtClean="0"/>
-              <a:t> special GPL. </a:t>
-            </a:r>
-            <a:endParaRPr lang="en-US" sz="3200" dirty="0" smtClean="0"/>
-          </a:p>
-          <a:p>
-            <a:pPr>
-              <a:buFont typeface="Wingdings" panose="05000000000000000000" pitchFamily="2" charset="2"/>
-              <a:buChar char="§"/>
-            </a:pPr>
-            <a:endParaRPr lang="en-US" sz="3200" dirty="0" smtClean="0"/>
+              <a:rPr lang="en-US" sz="2000" dirty="0" smtClean="0"/>
+              <a:t>Small bugs to be fixed before final   </a:t>
+            </a:r>
+          </a:p>
+          <a:p>
+            <a:pPr lvl="1">
+              <a:buFont typeface="Wingdings" panose="05000000000000000000" pitchFamily="2" charset="2"/>
+              <a:buChar char="§"/>
+            </a:pPr>
+            <a:r>
+              <a:rPr lang="en-US" sz="2000" dirty="0" smtClean="0"/>
+              <a:t>Never really got ahead on sprints</a:t>
+            </a:r>
+          </a:p>
+          <a:p>
+            <a:pPr lvl="1">
+              <a:buFont typeface="Wingdings" panose="05000000000000000000" pitchFamily="2" charset="2"/>
+              <a:buChar char="§"/>
+            </a:pPr>
+            <a:r>
+              <a:rPr lang="en-US" sz="2000" dirty="0" smtClean="0"/>
+              <a:t>Team let other obligations interfere with team efficiency at times outside of meetings</a:t>
+            </a:r>
           </a:p>
         </p:txBody>
       </p:sp>
     </p:spTree>
     <p:extLst>
       <p:ext uri="{BB962C8B-B14F-4D97-AF65-F5344CB8AC3E}">
-        <p14:creationId xmlns:p14="http://schemas.microsoft.com/office/powerpoint/2010/main" val="2470640020"/>
+        <p14:creationId xmlns:p14="http://schemas.microsoft.com/office/powerpoint/2010/main" val="2180296129"/>
       </p:ext>
     </p:extLst>
   </p:cSld>
@@ -4324,7 +4380,15 @@
           <a:p>
             <a:r>
               <a:rPr lang="en-US" dirty="0" smtClean="0"/>
-              <a:t>Successes and Failures</a:t>
+              <a:t>Risk </a:t>
+            </a:r>
+            <a:r>
+              <a:rPr lang="en-US" dirty="0"/>
+              <a:t>and </a:t>
+            </a:r>
+            <a:r>
+              <a:rPr lang="en-US" dirty="0" smtClean="0"/>
+              <a:t>Mitigation</a:t>
             </a:r>
             <a:endParaRPr lang="en-US" dirty="0"/>
           </a:p>
@@ -4342,124 +4406,104 @@
         </p:nvSpPr>
         <p:spPr/>
         <p:txBody>
-          <a:bodyPr/>
+          <a:bodyPr>
+            <a:normAutofit/>
+          </a:bodyPr>
           <a:lstStyle/>
           <a:p>
             <a:pPr>
               <a:buFont typeface="Wingdings" panose="05000000000000000000" pitchFamily="2" charset="2"/>
-              <a:buChar char="§"/>
+              <a:buChar char="n"/>
             </a:pPr>
             <a:r>
               <a:rPr lang="en-US" sz="2400" dirty="0" smtClean="0"/>
-              <a:t>Successes: </a:t>
+              <a:t>Usability:</a:t>
             </a:r>
           </a:p>
           <a:p>
             <a:pPr lvl="1">
               <a:buFont typeface="Wingdings" panose="05000000000000000000" pitchFamily="2" charset="2"/>
-              <a:buChar char="§"/>
-            </a:pPr>
-            <a:r>
-              <a:rPr lang="en-US" sz="2000" dirty="0" smtClean="0"/>
-              <a:t>On track to deliver final project</a:t>
+              <a:buChar char="n"/>
+            </a:pPr>
+            <a:r>
+              <a:rPr lang="en-US" sz="2200" dirty="0" smtClean="0"/>
+              <a:t>Continue to keep interfaces as simple as possible for user, while not compromising the wanted functionality</a:t>
             </a:r>
           </a:p>
           <a:p>
             <a:pPr lvl="1">
               <a:buFont typeface="Wingdings" panose="05000000000000000000" pitchFamily="2" charset="2"/>
-              <a:buChar char="§"/>
-            </a:pPr>
-            <a:r>
-              <a:rPr lang="en-US" sz="2000" dirty="0" smtClean="0"/>
-              <a:t>Team </a:t>
-            </a:r>
-            <a:r>
-              <a:rPr lang="en-US" sz="2000" dirty="0" smtClean="0"/>
-              <a:t>worked effectively </a:t>
-            </a:r>
-            <a:r>
-              <a:rPr lang="en-US" sz="2000" dirty="0" smtClean="0"/>
-              <a:t>overall</a:t>
+              <a:buChar char="n"/>
+            </a:pPr>
+            <a:r>
+              <a:rPr lang="en-US" sz="2200" dirty="0" smtClean="0"/>
+              <a:t>Retrieval of information and easy to use</a:t>
+            </a:r>
+            <a:endParaRPr lang="en-US" sz="2200" dirty="0"/>
+          </a:p>
+          <a:p>
+            <a:pPr>
+              <a:buFont typeface="Wingdings" panose="05000000000000000000" pitchFamily="2" charset="2"/>
+              <a:buChar char="n"/>
+            </a:pPr>
+            <a:r>
+              <a:rPr lang="en-US" sz="2400" dirty="0" smtClean="0"/>
+              <a:t>Data backup</a:t>
             </a:r>
           </a:p>
           <a:p>
             <a:pPr lvl="1">
               <a:buFont typeface="Wingdings" panose="05000000000000000000" pitchFamily="2" charset="2"/>
-              <a:buChar char="§"/>
-            </a:pPr>
-            <a:r>
-              <a:rPr lang="en-US" sz="2000" dirty="0" smtClean="0"/>
-              <a:t>Got project to a internal testing state (proof of function state) </a:t>
-            </a:r>
-            <a:endParaRPr lang="en-US" sz="2000" dirty="0" smtClean="0"/>
+              <a:buChar char="n"/>
+            </a:pPr>
+            <a:r>
+              <a:rPr lang="en-US" sz="2200" dirty="0" smtClean="0"/>
+              <a:t>Backup database in local machine and Linux box. </a:t>
+            </a:r>
+            <a:endParaRPr lang="en-US" sz="2400" dirty="0" smtClean="0"/>
           </a:p>
           <a:p>
             <a:pPr>
               <a:buFont typeface="Wingdings" panose="05000000000000000000" pitchFamily="2" charset="2"/>
-              <a:buChar char="§"/>
-            </a:pPr>
-            <a:endParaRPr lang="en-US" dirty="0"/>
-          </a:p>
-          <a:p>
-            <a:pPr>
-              <a:buFont typeface="Wingdings" panose="05000000000000000000" pitchFamily="2" charset="2"/>
-              <a:buChar char="§"/>
+              <a:buChar char="n"/>
             </a:pPr>
             <a:r>
               <a:rPr lang="en-US" sz="2400" dirty="0" smtClean="0"/>
-              <a:t>Failures:</a:t>
+              <a:t>Security </a:t>
             </a:r>
           </a:p>
           <a:p>
             <a:pPr lvl="1">
               <a:buFont typeface="Wingdings" panose="05000000000000000000" pitchFamily="2" charset="2"/>
-              <a:buChar char="§"/>
-            </a:pPr>
-            <a:r>
-              <a:rPr lang="en-US" sz="2000" dirty="0" smtClean="0"/>
-              <a:t>Small </a:t>
-            </a:r>
-            <a:r>
-              <a:rPr lang="en-US" sz="2000" dirty="0" smtClean="0"/>
-              <a:t>bugs to be fixed before final </a:t>
-            </a:r>
-            <a:r>
-              <a:rPr lang="en-US" sz="2000" dirty="0" smtClean="0"/>
-              <a:t>  </a:t>
-            </a:r>
-            <a:endParaRPr lang="en-US" sz="2000" dirty="0" smtClean="0"/>
+              <a:buChar char="n"/>
+            </a:pPr>
+            <a:r>
+              <a:rPr lang="en-US" sz="2200" dirty="0" smtClean="0"/>
+              <a:t>Encryption of the data</a:t>
+            </a:r>
           </a:p>
           <a:p>
             <a:pPr lvl="1">
               <a:buFont typeface="Wingdings" panose="05000000000000000000" pitchFamily="2" charset="2"/>
-              <a:buChar char="§"/>
-            </a:pPr>
-            <a:r>
-              <a:rPr lang="en-US" sz="2000" dirty="0" smtClean="0"/>
-              <a:t>Never really got ahead on sprints</a:t>
-            </a:r>
-          </a:p>
-          <a:p>
-            <a:pPr lvl="1">
-              <a:buFont typeface="Wingdings" panose="05000000000000000000" pitchFamily="2" charset="2"/>
-              <a:buChar char="§"/>
-            </a:pPr>
-            <a:r>
-              <a:rPr lang="en-US" sz="2000" dirty="0" smtClean="0"/>
-              <a:t>Team let other obligations interfere with team efficiency at times outside of </a:t>
-            </a:r>
-            <a:r>
-              <a:rPr lang="en-US" sz="2000" dirty="0" smtClean="0"/>
-              <a:t>meetings</a:t>
-            </a:r>
-            <a:endParaRPr lang="en-US" sz="2000" dirty="0" smtClean="0"/>
+              <a:buChar char="n"/>
+            </a:pPr>
+            <a:r>
+              <a:rPr lang="en-US" sz="2200" dirty="0" smtClean="0"/>
+              <a:t>Protect user data</a:t>
+            </a:r>
+          </a:p>
+          <a:p>
+            <a:pPr marL="0" indent="0">
+              <a:buNone/>
+            </a:pPr>
+            <a:endParaRPr lang="en-US" sz="2400" dirty="0"/>
           </a:p>
         </p:txBody>
       </p:sp>
     </p:spTree>
     <p:extLst>
       <p:ext uri="{BB962C8B-B14F-4D97-AF65-F5344CB8AC3E}">
-        <p14:creationId xmlns:p14="http://schemas.microsoft.com/office/powerpoint/2010/main" val="2180296129"/>
+        <p14:creationId xmlns:p14="http://schemas.microsoft.com/office/powerpoint/2010/main" val="3480468452"/>
       </p:ext>
     </p:extLst>
   </p:cSld>
@@ -4510,15 +4554,7 @@
           <a:p>
             <a:r>
               <a:rPr lang="en-US" dirty="0" smtClean="0"/>
-              <a:t>Risk </a:t>
-            </a:r>
-            <a:r>
-              <a:rPr lang="en-US" dirty="0"/>
-              <a:t>and </a:t>
-            </a:r>
-            <a:r>
-              <a:rPr lang="en-US" dirty="0" smtClean="0"/>
-              <a:t>Mitigation</a:t>
+              <a:t>Prototype/Demo</a:t>
             </a:r>
             <a:endParaRPr lang="en-US" dirty="0"/>
           </a:p>
@@ -4536,104 +4572,17 @@
         </p:nvSpPr>
         <p:spPr/>
         <p:txBody>
-          <a:bodyPr>
-            <a:normAutofit/>
-          </a:bodyPr>
-          <a:lstStyle/>
-          <a:p>
-            <a:pPr>
-              <a:buFont typeface="Wingdings" panose="05000000000000000000" pitchFamily="2" charset="2"/>
-              <a:buChar char="n"/>
-            </a:pPr>
-            <a:r>
-              <a:rPr lang="en-US" sz="2400" dirty="0" smtClean="0"/>
-              <a:t>Usability:</a:t>
-            </a:r>
-          </a:p>
-          <a:p>
-            <a:pPr lvl="1">
-              <a:buFont typeface="Wingdings" panose="05000000000000000000" pitchFamily="2" charset="2"/>
-              <a:buChar char="n"/>
-            </a:pPr>
-            <a:r>
-              <a:rPr lang="en-US" sz="2200" dirty="0" smtClean="0"/>
-              <a:t>Continue to keep interfaces as simple as possible for user, while not compromising the wanted functionality</a:t>
-            </a:r>
-          </a:p>
-          <a:p>
-            <a:pPr lvl="1">
-              <a:buFont typeface="Wingdings" panose="05000000000000000000" pitchFamily="2" charset="2"/>
-              <a:buChar char="n"/>
-            </a:pPr>
-            <a:r>
-              <a:rPr lang="en-US" sz="2200" dirty="0" smtClean="0"/>
-              <a:t>Retrieval of information and easy to use</a:t>
-            </a:r>
-            <a:endParaRPr lang="en-US" sz="2200" dirty="0"/>
-          </a:p>
-          <a:p>
-            <a:pPr>
-              <a:buFont typeface="Wingdings" panose="05000000000000000000" pitchFamily="2" charset="2"/>
-              <a:buChar char="n"/>
-            </a:pPr>
-            <a:r>
-              <a:rPr lang="en-US" sz="2400" dirty="0" smtClean="0"/>
-              <a:t>Data backup</a:t>
-            </a:r>
-          </a:p>
-          <a:p>
-            <a:pPr lvl="1">
-              <a:buFont typeface="Wingdings" panose="05000000000000000000" pitchFamily="2" charset="2"/>
-              <a:buChar char="n"/>
-            </a:pPr>
-            <a:r>
-              <a:rPr lang="en-US" sz="2200" dirty="0" smtClean="0"/>
-              <a:t>Backup database in local machine and Linux box. </a:t>
-            </a:r>
-            <a:endParaRPr lang="en-US" sz="2400" dirty="0" smtClean="0"/>
-          </a:p>
-          <a:p>
-            <a:pPr>
-              <a:buFont typeface="Wingdings" panose="05000000000000000000" pitchFamily="2" charset="2"/>
-              <a:buChar char="n"/>
-            </a:pPr>
-            <a:r>
-              <a:rPr lang="en-US" sz="2400" dirty="0" smtClean="0"/>
-              <a:t>Security </a:t>
-            </a:r>
-          </a:p>
-          <a:p>
-            <a:pPr lvl="1">
-              <a:buFont typeface="Wingdings" panose="05000000000000000000" pitchFamily="2" charset="2"/>
-              <a:buChar char="n"/>
-            </a:pPr>
-            <a:r>
-              <a:rPr lang="en-US" sz="2200" dirty="0" smtClean="0"/>
-              <a:t>Encryption of the data</a:t>
-            </a:r>
-          </a:p>
-          <a:p>
-            <a:pPr lvl="1">
-              <a:buFont typeface="Wingdings" panose="05000000000000000000" pitchFamily="2" charset="2"/>
-              <a:buChar char="n"/>
-            </a:pPr>
-            <a:r>
-              <a:rPr lang="en-US" sz="2200" dirty="0" smtClean="0"/>
-              <a:t>Protect user data</a:t>
-            </a:r>
-          </a:p>
-          <a:p>
-            <a:pPr marL="0" indent="0">
-              <a:buNone/>
-            </a:pPr>
-            <a:endParaRPr lang="en-US" sz="2400" dirty="0"/>
+          <a:bodyPr/>
+          <a:lstStyle/>
+          <a:p>
+            <a:endParaRPr lang="en-US"/>
           </a:p>
         </p:txBody>
       </p:sp>
     </p:spTree>
     <p:extLst>
       <p:ext uri="{BB962C8B-B14F-4D97-AF65-F5344CB8AC3E}">
-        <p14:creationId xmlns:p14="http://schemas.microsoft.com/office/powerpoint/2010/main" val="3480468452"/>
+        <p14:creationId xmlns:p14="http://schemas.microsoft.com/office/powerpoint/2010/main" val="3932090167"/>
       </p:ext>
     </p:extLst>
   </p:cSld>
@@ -4684,11 +4633,7 @@
           <a:p>
             <a:r>
               <a:rPr lang="en-US" dirty="0" smtClean="0"/>
-              <a:t>The Last </a:t>
-            </a:r>
-            <a:r>
-              <a:rPr lang="en-US" dirty="0" smtClean="0"/>
-              <a:t>Sprint</a:t>
+              <a:t>The Last Sprint</a:t>
             </a:r>
             <a:endParaRPr lang="en-US" dirty="0"/>
           </a:p>
@@ -4723,15 +4668,7 @@
             </a:pPr>
             <a:r>
               <a:rPr lang="en-US" dirty="0" smtClean="0"/>
-              <a:t>Clean </a:t>
-            </a:r>
-            <a:r>
-              <a:rPr lang="en-US" dirty="0" smtClean="0"/>
-              <a:t>up GUI </a:t>
-            </a:r>
-            <a:r>
-              <a:rPr lang="en-US" dirty="0" smtClean="0"/>
-              <a:t>work </a:t>
+              <a:t>Clean up GUI work </a:t>
             </a:r>
           </a:p>
           <a:p>
@@ -4781,23 +4718,7 @@
             </a:pPr>
             <a:r>
               <a:rPr lang="en-US" dirty="0" smtClean="0"/>
-              <a:t> </a:t>
-            </a:r>
-            <a:r>
-              <a:rPr lang="en-US" dirty="0" smtClean="0"/>
-              <a:t>Design </a:t>
-            </a:r>
-            <a:r>
-              <a:rPr lang="en-US" dirty="0" smtClean="0"/>
-              <a:t>Fair </a:t>
-            </a:r>
-            <a:r>
-              <a:rPr lang="en-US" dirty="0" smtClean="0"/>
-              <a:t>P</a:t>
-            </a:r>
-            <a:r>
-              <a:rPr lang="en-US" dirty="0" smtClean="0"/>
-              <a:t>reparation</a:t>
+              <a:t> Design Fair Preparation</a:t>
             </a:r>
           </a:p>
           <a:p>
@@ -5290,7 +5211,7 @@
         <p:spPr/>
         <p:txBody>
           <a:bodyPr>
-            <a:normAutofit fontScale="92500" lnSpcReduction="20000"/>
+            <a:normAutofit lnSpcReduction="10000"/>
           </a:bodyPr>
           <a:lstStyle/>
           <a:p>
@@ -5310,7 +5231,47 @@
             </a:pPr>
             <a:r>
               <a:rPr lang="en-US" sz="2000" dirty="0" smtClean="0"/>
-              <a:t>Developing a software for administers and teachers and students in Academy of Dance arts to manage the day-to-day activities. </a:t>
+              <a:t>Developing a software for administers and </a:t>
+            </a:r>
+            <a:r>
+              <a:rPr lang="en-US" sz="2000" dirty="0" smtClean="0"/>
+              <a:t>teachers </a:t>
+            </a:r>
+            <a:r>
+              <a:rPr lang="en-US" sz="2000" dirty="0"/>
+              <a:t>a</a:t>
+            </a:r>
+            <a:r>
+              <a:rPr lang="en-US" sz="2000" dirty="0" smtClean="0"/>
+              <a:t>t</a:t>
+            </a:r>
+            <a:r>
+              <a:rPr lang="en-US" sz="2000" dirty="0" smtClean="0"/>
+              <a:t> </a:t>
+            </a:r>
+            <a:r>
+              <a:rPr lang="en-US" sz="2000" dirty="0" smtClean="0"/>
+              <a:t>Academy of Dance </a:t>
+            </a:r>
+            <a:r>
+              <a:rPr lang="en-US" sz="2000" dirty="0"/>
+              <a:t>A</a:t>
+            </a:r>
+            <a:r>
+              <a:rPr lang="en-US" sz="2000" dirty="0" smtClean="0"/>
+              <a:t>rts </a:t>
+            </a:r>
+            <a:r>
+              <a:rPr lang="en-US" sz="2000" dirty="0" smtClean="0"/>
+              <a:t>to manage the </a:t>
+            </a:r>
+            <a:r>
+              <a:rPr lang="en-US" sz="2000" dirty="0" smtClean="0"/>
+              <a:t>day-to-da </a:t>
+            </a:r>
+            <a:r>
+              <a:rPr lang="en-US" sz="2000" dirty="0" smtClean="0"/>
+              <a:t>activities. </a:t>
             </a:r>
           </a:p>
           <a:p>
@@ -5334,24 +5295,39 @@
             </a:pPr>
             <a:r>
               <a:rPr lang="en-US" sz="2000" dirty="0" smtClean="0"/>
-              <a:t>Database needs to store administers and teachers and students and classes </a:t>
-            </a:r>
-            <a:r>
-              <a:rPr lang="en-US" altLang="zh-CN" sz="2000" dirty="0"/>
-              <a:t>information</a:t>
-            </a:r>
+              <a:t>Database </a:t>
+            </a:r>
+            <a:endParaRPr lang="en-US" sz="2000" dirty="0" smtClean="0"/>
+          </a:p>
+          <a:p>
+            <a:pPr lvl="1">
+              <a:buFont typeface="Wingdings" panose="05000000000000000000" pitchFamily="2" charset="2"/>
+              <a:buChar char="§"/>
+            </a:pPr>
             <a:r>
               <a:rPr lang="en-US" sz="2000" dirty="0" smtClean="0"/>
-              <a:t>, it also needs to be accessed by </a:t>
-            </a:r>
-            <a:r>
-              <a:rPr lang="en-US" sz="2000" dirty="0" smtClean="0"/>
-              <a:t>two different  </a:t>
-            </a:r>
-            <a:r>
-              <a:rPr lang="en-US" sz="2000" dirty="0" smtClean="0"/>
-              <a:t>permission levels.</a:t>
-            </a:r>
+              <a:t>GUI</a:t>
+            </a:r>
+            <a:r>
+              <a:rPr lang="en-US" altLang="zh-CN" sz="2000" dirty="0" smtClean="0"/>
+              <a:t> </a:t>
+            </a:r>
+            <a:endParaRPr lang="en-US" sz="2000" dirty="0" smtClean="0"/>
+          </a:p>
+          <a:p>
+            <a:pPr>
+              <a:buFont typeface="Wingdings" panose="05000000000000000000" pitchFamily="2" charset="2"/>
+              <a:buChar char="§"/>
+            </a:pPr>
+            <a:r>
+              <a:rPr lang="en-US" altLang="zh-CN" dirty="0"/>
+              <a:t>Development </a:t>
+            </a:r>
+            <a:r>
+              <a:rPr lang="en-US" altLang="zh-CN" dirty="0" smtClean="0"/>
+              <a:t>Constraints </a:t>
+            </a:r>
+            <a:endParaRPr lang="en-US" altLang="zh-CN" dirty="0"/>
           </a:p>
           <a:p>
             <a:pPr lvl="1">
@@ -5359,56 +5335,10 @@
               <a:buChar char="§"/>
             </a:pPr>
             <a:r>
-              <a:rPr lang="en-US" sz="2000" dirty="0" smtClean="0"/>
-              <a:t>GUI needs to be as intuitive as possible to use and it should display </a:t>
-            </a:r>
-            <a:r>
-              <a:rPr lang="en-US" altLang="zh-CN" sz="2000" dirty="0"/>
-              <a:t>administers and teachers and students and classes </a:t>
-            </a:r>
-            <a:r>
-              <a:rPr lang="en-US" altLang="zh-CN" sz="2000" dirty="0" smtClean="0"/>
-              <a:t>information when user request it. </a:t>
-            </a:r>
-            <a:endParaRPr lang="en-US" sz="2000" dirty="0" smtClean="0"/>
-          </a:p>
-          <a:p>
-            <a:pPr>
-              <a:buFont typeface="Wingdings" panose="05000000000000000000" pitchFamily="2" charset="2"/>
-              <a:buChar char="§"/>
-            </a:pPr>
-            <a:r>
-              <a:rPr lang="en-US" altLang="zh-CN" dirty="0"/>
-              <a:t>Development Constraints</a:t>
-            </a:r>
-          </a:p>
-          <a:p>
-            <a:pPr lvl="1">
-              <a:buFont typeface="Wingdings" panose="05000000000000000000" pitchFamily="2" charset="2"/>
-              <a:buChar char="§"/>
-            </a:pPr>
-            <a:r>
-              <a:rPr lang="en-US" altLang="zh-CN" dirty="0"/>
-              <a:t>Project must be open source. </a:t>
-            </a:r>
-          </a:p>
-          <a:p>
-            <a:pPr lvl="1">
-              <a:buFont typeface="Wingdings" panose="05000000000000000000" pitchFamily="2" charset="2"/>
-              <a:buChar char="§"/>
-            </a:pPr>
-            <a:r>
               <a:rPr lang="en-US" altLang="zh-CN" dirty="0" smtClean="0"/>
-              <a:t>Wi-Fi/bandwidth </a:t>
-            </a:r>
-            <a:r>
-              <a:rPr lang="en-US" altLang="zh-CN" dirty="0"/>
-              <a:t>issues for the </a:t>
-            </a:r>
-            <a:r>
-              <a:rPr lang="en-US" altLang="zh-CN" dirty="0" smtClean="0"/>
-              <a:t>academy</a:t>
-            </a:r>
+              <a:t>Open Source</a:t>
+            </a:r>
+            <a:endParaRPr lang="en-US" altLang="zh-CN" dirty="0" smtClean="0"/>
           </a:p>
           <a:p>
             <a:pPr>
@@ -5539,8 +5469,8 @@
         </p:blipFill>
         <p:spPr bwMode="auto">
           <a:xfrm>
-            <a:off x="1670999" y="1827513"/>
-            <a:ext cx="8678508" cy="4022725"/>
+            <a:off x="1237323" y="1877403"/>
+            <a:ext cx="9778313" cy="4258446"/>
           </a:xfrm>
           <a:prstGeom prst="rect">
             <a:avLst/>
@@ -5653,7 +5583,7 @@
         </p:blipFill>
         <p:spPr bwMode="auto">
           <a:xfrm>
-            <a:off x="2206942" y="1802308"/>
+            <a:off x="2182228" y="1843497"/>
             <a:ext cx="7839075" cy="4405745"/>
           </a:xfrm>
           <a:prstGeom prst="rect">
@@ -5767,17 +5697,8 @@
             </a:pPr>
             <a:r>
               <a:rPr lang="en-US" altLang="zh-CN" dirty="0" smtClean="0"/>
-              <a:t>User Stories worked on since </a:t>
-            </a:r>
-            <a:r>
-              <a:rPr lang="en-US" altLang="zh-CN" dirty="0" smtClean="0"/>
-              <a:t>new semester</a:t>
-            </a:r>
-            <a:r>
-              <a:rPr lang="en-US" altLang="zh-CN" dirty="0" smtClean="0"/>
-              <a:t>: </a:t>
-            </a:r>
-            <a:endParaRPr lang="en-US" altLang="zh-CN" dirty="0" smtClean="0"/>
+              <a:t>User Stories worked on since new semester: </a:t>
+            </a:r>
           </a:p>
           <a:p>
             <a:pPr>
@@ -5788,7 +5709,6 @@
               <a:rPr lang="en-US" altLang="zh-CN" dirty="0" smtClean="0"/>
               <a:t> Payroll and Billing</a:t>
             </a:r>
-            <a:endParaRPr lang="en-US" altLang="zh-CN" dirty="0" smtClean="0"/>
           </a:p>
           <a:p>
             <a:pPr lvl="1">
@@ -5809,7 +5729,6 @@
               <a:rPr lang="en-US" altLang="zh-CN" dirty="0" smtClean="0"/>
               <a:t>Teacher Hours</a:t>
             </a:r>
-            <a:endParaRPr lang="en-US" altLang="zh-CN" dirty="0" smtClean="0"/>
           </a:p>
           <a:p>
             <a:pPr lvl="1">
@@ -5820,7 +5739,6 @@
               <a:rPr lang="en-US" altLang="zh-CN" dirty="0" smtClean="0"/>
               <a:t>Etc..</a:t>
             </a:r>
-            <a:endParaRPr lang="en-US" altLang="zh-CN" dirty="0" smtClean="0"/>
           </a:p>
           <a:p>
             <a:pPr>
@@ -5841,7 +5759,6 @@
               <a:rPr lang="en-US" altLang="zh-CN" dirty="0" smtClean="0"/>
               <a:t>Added after student interface was dropped from requirements,</a:t>
             </a:r>
-            <a:endParaRPr lang="en-US" altLang="zh-CN" dirty="0" smtClean="0"/>
           </a:p>
           <a:p>
             <a:pPr>
@@ -5858,15 +5775,7 @@
             </a:r>
             <a:r>
               <a:rPr lang="en-US" altLang="zh-CN" dirty="0" smtClean="0"/>
-              <a:t>uality </a:t>
-            </a:r>
-            <a:r>
-              <a:rPr lang="en-US" altLang="zh-CN" dirty="0" smtClean="0"/>
-              <a:t>U</a:t>
-            </a:r>
-            <a:r>
-              <a:rPr lang="en-US" altLang="zh-CN" dirty="0" smtClean="0"/>
-              <a:t>pdates</a:t>
+              <a:t>uality Updates</a:t>
             </a:r>
             <a:endParaRPr lang="en-US" altLang="zh-CN" dirty="0"/>
           </a:p>
@@ -5934,15 +5843,7 @@
             </a:r>
             <a:r>
               <a:rPr lang="en-US" dirty="0" smtClean="0"/>
-              <a:t>ince </a:t>
-            </a:r>
-            <a:r>
-              <a:rPr lang="en-US" dirty="0" smtClean="0"/>
-              <a:t>Semester</a:t>
-            </a:r>
-            <a:r>
-              <a:rPr lang="en-US" dirty="0" smtClean="0"/>
-              <a:t> </a:t>
+              <a:t>ince Semester </a:t>
             </a:r>
             <a:endParaRPr lang="en-US" dirty="0"/>
           </a:p>
@@ -5980,7 +5881,6 @@
               <a:rPr lang="en-US" sz="2400" dirty="0" smtClean="0"/>
               <a:t>Quality of life updates</a:t>
             </a:r>
-            <a:endParaRPr lang="en-US" sz="2400" dirty="0" smtClean="0"/>
           </a:p>
           <a:p>
             <a:pPr>
@@ -5991,7 +5891,6 @@
               <a:rPr lang="en-US" sz="2400" dirty="0" smtClean="0"/>
               <a:t>Removal Function to maintain database</a:t>
             </a:r>
-            <a:endParaRPr lang="en-US" sz="2400" dirty="0" smtClean="0"/>
           </a:p>
           <a:p>
             <a:pPr>
@@ -6002,7 +5901,6 @@
               <a:rPr lang="en-US" sz="2400" dirty="0" smtClean="0"/>
               <a:t>Teacher Hours/Payment </a:t>
             </a:r>
-            <a:endParaRPr lang="en-US" sz="2400" dirty="0" smtClean="0"/>
           </a:p>
           <a:p>
             <a:pPr>
@@ -6023,7 +5921,6 @@
               <a:rPr lang="en-US" sz="2400" dirty="0" smtClean="0"/>
               <a:t>Student/Family Billing and payments</a:t>
             </a:r>
-            <a:endParaRPr lang="en-US" sz="2400" dirty="0" smtClean="0"/>
           </a:p>
           <a:p>
             <a:pPr>
@@ -6034,7 +5931,6 @@
               <a:rPr lang="en-US" sz="2400" dirty="0" smtClean="0"/>
               <a:t>Registration</a:t>
             </a:r>
-            <a:endParaRPr lang="en-US" sz="2400" dirty="0" smtClean="0"/>
           </a:p>
           <a:p>
             <a:pPr>
@@ -6045,7 +5941,6 @@
               <a:rPr lang="en-US" sz="2400" dirty="0" smtClean="0"/>
               <a:t>Fix Bugs</a:t>
             </a:r>
-            <a:endParaRPr lang="en-US" sz="2400" dirty="0" smtClean="0"/>
           </a:p>
         </p:txBody>
       </p:sp>
@@ -6134,7 +6029,6 @@
               <a:rPr lang="en-US" sz="2400" dirty="0" smtClean="0"/>
               <a:t> Remaining client request  </a:t>
             </a:r>
-            <a:endParaRPr lang="en-US" sz="2400" dirty="0" smtClean="0"/>
           </a:p>
           <a:p>
             <a:pPr lvl="1">
@@ -6145,7 +6039,6 @@
               <a:rPr lang="en-US" sz="2400" dirty="0" smtClean="0"/>
               <a:t>Student Registration</a:t>
             </a:r>
-            <a:endParaRPr lang="en-US" sz="2400" dirty="0" smtClean="0"/>
           </a:p>
           <a:p>
             <a:pPr lvl="1">
@@ -6166,7 +6059,6 @@
               <a:rPr lang="en-US" sz="2400" dirty="0" smtClean="0"/>
               <a:t>Final deployment </a:t>
             </a:r>
-            <a:endParaRPr lang="en-US" sz="2400" dirty="0" smtClean="0"/>
           </a:p>
           <a:p>
             <a:pPr>
@@ -6177,7 +6069,6 @@
               <a:rPr lang="en-US" sz="2400" dirty="0" smtClean="0"/>
               <a:t>Clean up and quality of life updates</a:t>
             </a:r>
-            <a:endParaRPr lang="en-US" sz="2400" dirty="0" smtClean="0"/>
           </a:p>
           <a:p>
             <a:pPr lvl="1">
@@ -6188,7 +6079,6 @@
               <a:rPr lang="en-US" sz="2400" dirty="0" smtClean="0"/>
               <a:t>Interfaces</a:t>
             </a:r>
-            <a:endParaRPr lang="en-US" sz="2400" dirty="0" smtClean="0"/>
           </a:p>
           <a:p>
             <a:pPr lvl="1">
@@ -6199,7 +6089,6 @@
               <a:rPr lang="en-US" sz="2400" dirty="0" smtClean="0"/>
               <a:t>Help Guides/User Guide</a:t>
             </a:r>
-            <a:endParaRPr lang="en-US" sz="2400" dirty="0" smtClean="0"/>
           </a:p>
           <a:p>
             <a:pPr lvl="1">
@@ -6210,7 +6099,6 @@
               <a:rPr lang="en-US" sz="2400" dirty="0" smtClean="0"/>
               <a:t>Other request from client</a:t>
             </a:r>
-            <a:endParaRPr lang="en-US" sz="2400" dirty="0" smtClean="0"/>
           </a:p>
           <a:p>
             <a:pPr>
@@ -6308,15 +6196,7 @@
             </a:pPr>
             <a:r>
               <a:rPr lang="en-US" dirty="0" smtClean="0"/>
-              <a:t> Some interior code testing like </a:t>
-            </a:r>
-            <a:r>
-              <a:rPr lang="en-US" dirty="0" smtClean="0"/>
-              <a:t>SQL </a:t>
-            </a:r>
-            <a:r>
-              <a:rPr lang="en-US" dirty="0" smtClean="0"/>
-              <a:t>Query within code</a:t>
+              <a:t> Some interior code testing like SQL Query within code</a:t>
             </a:r>
           </a:p>
           <a:p>
@@ -6346,30 +6226,18 @@
             </a:pPr>
             <a:r>
               <a:rPr lang="en-US" dirty="0" smtClean="0"/>
-              <a:t>Most test were database interactions and then checking for correct results</a:t>
-            </a:r>
+              <a:t>Most test were database interactions and then checking for correct results.</a:t>
+            </a:r>
+            <a:endParaRPr lang="en-US" dirty="0"/>
+          </a:p>
+          <a:p>
+            <a:pPr>
+              <a:buFont typeface="Wingdings" panose="05000000000000000000" pitchFamily="2" charset="2"/>
+              <a:buChar char="§"/>
+            </a:pPr>
             <a:r>
               <a:rPr lang="en-US" dirty="0" smtClean="0"/>
-              <a:t>.</a:t>
-            </a:r>
-            <a:endParaRPr lang="en-US" dirty="0"/>
-          </a:p>
-          <a:p>
-            <a:pPr>
-              <a:buFont typeface="Wingdings" panose="05000000000000000000" pitchFamily="2" charset="2"/>
-              <a:buChar char="§"/>
-            </a:pPr>
-            <a:r>
-              <a:rPr lang="en-US" dirty="0" smtClean="0"/>
-              <a:t>Final</a:t>
-            </a:r>
-            <a:r>
-              <a:rPr lang="en-US" dirty="0" smtClean="0"/>
-              <a:t> </a:t>
-            </a:r>
-            <a:r>
-              <a:rPr lang="en-US" dirty="0" smtClean="0"/>
-              <a:t>Testing:</a:t>
+              <a:t>Final Testing:</a:t>
             </a:r>
           </a:p>
           <a:p>
@@ -6381,7 +6249,6 @@
               <a:rPr lang="en-US" dirty="0" smtClean="0"/>
               <a:t>Start from opening of system down</a:t>
             </a:r>
-            <a:endParaRPr lang="en-US" dirty="0" smtClean="0"/>
           </a:p>
           <a:p>
             <a:pPr lvl="1">
@@ -6392,7 +6259,6 @@
               <a:rPr lang="en-US" dirty="0" smtClean="0"/>
               <a:t>Confirmation that all requirements can be accomplished within system</a:t>
             </a:r>
-            <a:endParaRPr lang="en-US" dirty="0" smtClean="0"/>
           </a:p>
           <a:p>
             <a:pPr lvl="1">
@@ -6403,7 +6269,6 @@
               <a:rPr lang="en-US" dirty="0" smtClean="0"/>
               <a:t>Find small bugs or needed quality updates</a:t>
             </a:r>
-            <a:endParaRPr lang="en-US" dirty="0" smtClean="0"/>
           </a:p>
           <a:p>
             <a:pPr>

</xml_diff>